<commit_message>
update the jupyter notebook of the vortex example
</commit_message>
<xml_diff>
--- a/case_drifters_german_bight/progress/lsc_221102.pptx
+++ b/case_drifters_german_bight/progress/lsc_221102.pptx
@@ -10,7 +10,15 @@
     <p:sldId id="258" r:id="rId4"/>
     <p:sldId id="259" r:id="rId5"/>
     <p:sldId id="260" r:id="rId6"/>
-    <p:sldId id="261" r:id="rId7"/>
+    <p:sldId id="265" r:id="rId7"/>
+    <p:sldId id="262" r:id="rId8"/>
+    <p:sldId id="264" r:id="rId9"/>
+    <p:sldId id="263" r:id="rId10"/>
+    <p:sldId id="266" r:id="rId11"/>
+    <p:sldId id="261" r:id="rId12"/>
+    <p:sldId id="267" r:id="rId13"/>
+    <p:sldId id="268" r:id="rId14"/>
+    <p:sldId id="269" r:id="rId15"/>
   </p:sldIdLst>
   <p:sldSz cx="12192000" cy="6858000"/>
   <p:notesSz cx="6858000" cy="9144000"/>
@@ -117,6 +125,90 @@
 </p:presentation>
 </file>
 
+<file path=ppt/ink/ink1.xml><?xml version="1.0" encoding="utf-8"?>
+<inkml:ink xmlns:inkml="http://www.w3.org/2003/InkML">
+  <inkml:definitions>
+    <inkml:context xml:id="ctx0">
+      <inkml:inkSource xml:id="inkSrc0">
+        <inkml:traceFormat>
+          <inkml:channel name="X" type="integer" min="-2.14748E9" max="2.14748E9" units="cm"/>
+          <inkml:channel name="Y" type="integer" min="-2.14748E9" max="2.14748E9" units="cm"/>
+          <inkml:channel name="F" type="integer" max="32767" units="dev"/>
+        </inkml:traceFormat>
+        <inkml:channelProperties>
+          <inkml:channelProperty channel="X" name="resolution" value="1000" units="1/cm"/>
+          <inkml:channelProperty channel="Y" name="resolution" value="1000" units="1/cm"/>
+          <inkml:channelProperty channel="F" name="resolution" value="0" units="1/dev"/>
+        </inkml:channelProperties>
+      </inkml:inkSource>
+      <inkml:timestamp xml:id="ts0" timeString="2022-11-11T14:10:17.690"/>
+    </inkml:context>
+    <inkml:brush xml:id="br0">
+      <inkml:brushProperty name="width" value="0.05" units="cm"/>
+      <inkml:brushProperty name="height" value="0.05" units="cm"/>
+      <inkml:brushProperty name="color" value="#E71224"/>
+    </inkml:brush>
+  </inkml:definitions>
+  <inkml:trace contextRef="#ctx0" brushRef="#br0">1 0 24575,'493'0'0,"-477"2"19,0-1 0,0 2 0,-1 0 0,1 1 0,28 11 0,28 8-1498,-52-19-5347</inkml:trace>
+</inkml:ink>
+</file>
+
+<file path=ppt/ink/ink2.xml><?xml version="1.0" encoding="utf-8"?>
+<inkml:ink xmlns:inkml="http://www.w3.org/2003/InkML">
+  <inkml:definitions>
+    <inkml:context xml:id="ctx0">
+      <inkml:inkSource xml:id="inkSrc0">
+        <inkml:traceFormat>
+          <inkml:channel name="X" type="integer" min="-2.14748E9" max="2.14748E9" units="cm"/>
+          <inkml:channel name="Y" type="integer" min="-2.14748E9" max="2.14748E9" units="cm"/>
+          <inkml:channel name="F" type="integer" max="32767" units="dev"/>
+        </inkml:traceFormat>
+        <inkml:channelProperties>
+          <inkml:channelProperty channel="X" name="resolution" value="1000" units="1/cm"/>
+          <inkml:channelProperty channel="Y" name="resolution" value="1000" units="1/cm"/>
+          <inkml:channelProperty channel="F" name="resolution" value="0" units="1/dev"/>
+        </inkml:channelProperties>
+      </inkml:inkSource>
+      <inkml:timestamp xml:id="ts0" timeString="2022-11-11T14:10:18.083"/>
+    </inkml:context>
+    <inkml:brush xml:id="br0">
+      <inkml:brushProperty name="width" value="0.05" units="cm"/>
+      <inkml:brushProperty name="height" value="0.05" units="cm"/>
+      <inkml:brushProperty name="color" value="#E71224"/>
+    </inkml:brush>
+  </inkml:definitions>
+  <inkml:trace contextRef="#ctx0" brushRef="#br0">1 1 24575,'0'0'-8191</inkml:trace>
+</inkml:ink>
+</file>
+
+<file path=ppt/ink/ink3.xml><?xml version="1.0" encoding="utf-8"?>
+<inkml:ink xmlns:inkml="http://www.w3.org/2003/InkML">
+  <inkml:definitions>
+    <inkml:context xml:id="ctx0">
+      <inkml:inkSource xml:id="inkSrc0">
+        <inkml:traceFormat>
+          <inkml:channel name="X" type="integer" min="-2.14748E9" max="2.14748E9" units="cm"/>
+          <inkml:channel name="Y" type="integer" min="-2.14748E9" max="2.14748E9" units="cm"/>
+          <inkml:channel name="F" type="integer" max="32767" units="dev"/>
+        </inkml:traceFormat>
+        <inkml:channelProperties>
+          <inkml:channelProperty channel="X" name="resolution" value="1000" units="1/cm"/>
+          <inkml:channelProperty channel="Y" name="resolution" value="1000" units="1/cm"/>
+          <inkml:channelProperty channel="F" name="resolution" value="0" units="1/dev"/>
+        </inkml:channelProperties>
+      </inkml:inkSource>
+      <inkml:timestamp xml:id="ts0" timeString="2022-11-11T14:40:19.747"/>
+    </inkml:context>
+    <inkml:brush xml:id="br0">
+      <inkml:brushProperty name="width" value="0.05" units="cm"/>
+      <inkml:brushProperty name="height" value="0.05" units="cm"/>
+      <inkml:brushProperty name="color" value="#E71224"/>
+    </inkml:brush>
+  </inkml:definitions>
+  <inkml:trace contextRef="#ctx0" brushRef="#br0">0 138 24575,'659'0'0,"-643"-1"0,0-1 0,-1-1 0,1 0 0,-1-1 0,26-10 0,-24 8 0,1 0 0,1 1 0,28-4 0,30 7 0,-55 3 0,-1-2 0,0 0 0,1-1 0,20-5 0,50-22-16,-67 19-208,0 2-1,0 1 0,1 1 0,-1 1 0,38-2 0,-39 7-6601</inkml:trace>
+</inkml:ink>
+</file>
+
 <file path=ppt/slideLayouts/slideLayout1.xml><?xml version="1.0" encoding="utf-8"?>
 <p:sldLayout xmlns:a="http://schemas.openxmlformats.org/drawingml/2006/main" xmlns:r="http://schemas.openxmlformats.org/officeDocument/2006/relationships" xmlns:p="http://schemas.openxmlformats.org/presentationml/2006/main" type="title" preserve="1">
   <p:cSld name="标题幻灯片">
@@ -264,7 +356,7 @@
           <a:p>
             <a:fld id="{EA6DD7DC-0098-4A4E-830C-B0D4E0F8B2FC}" type="datetimeFigureOut">
               <a:rPr lang="zh-CN" altLang="en-US" smtClean="0"/>
-              <a:t>2022/11/3</a:t>
+              <a:t>2022/11/30</a:t>
             </a:fld>
             <a:endParaRPr lang="zh-CN" altLang="en-US"/>
           </a:p>
@@ -462,7 +554,7 @@
           <a:p>
             <a:fld id="{EA6DD7DC-0098-4A4E-830C-B0D4E0F8B2FC}" type="datetimeFigureOut">
               <a:rPr lang="zh-CN" altLang="en-US" smtClean="0"/>
-              <a:t>2022/11/3</a:t>
+              <a:t>2022/11/30</a:t>
             </a:fld>
             <a:endParaRPr lang="zh-CN" altLang="en-US"/>
           </a:p>
@@ -670,7 +762,7 @@
           <a:p>
             <a:fld id="{EA6DD7DC-0098-4A4E-830C-B0D4E0F8B2FC}" type="datetimeFigureOut">
               <a:rPr lang="zh-CN" altLang="en-US" smtClean="0"/>
-              <a:t>2022/11/3</a:t>
+              <a:t>2022/11/30</a:t>
             </a:fld>
             <a:endParaRPr lang="zh-CN" altLang="en-US"/>
           </a:p>
@@ -868,7 +960,7 @@
           <a:p>
             <a:fld id="{EA6DD7DC-0098-4A4E-830C-B0D4E0F8B2FC}" type="datetimeFigureOut">
               <a:rPr lang="zh-CN" altLang="en-US" smtClean="0"/>
-              <a:t>2022/11/3</a:t>
+              <a:t>2022/11/30</a:t>
             </a:fld>
             <a:endParaRPr lang="zh-CN" altLang="en-US"/>
           </a:p>
@@ -1143,7 +1235,7 @@
           <a:p>
             <a:fld id="{EA6DD7DC-0098-4A4E-830C-B0D4E0F8B2FC}" type="datetimeFigureOut">
               <a:rPr lang="zh-CN" altLang="en-US" smtClean="0"/>
-              <a:t>2022/11/3</a:t>
+              <a:t>2022/11/30</a:t>
             </a:fld>
             <a:endParaRPr lang="zh-CN" altLang="en-US"/>
           </a:p>
@@ -1408,7 +1500,7 @@
           <a:p>
             <a:fld id="{EA6DD7DC-0098-4A4E-830C-B0D4E0F8B2FC}" type="datetimeFigureOut">
               <a:rPr lang="zh-CN" altLang="en-US" smtClean="0"/>
-              <a:t>2022/11/3</a:t>
+              <a:t>2022/11/30</a:t>
             </a:fld>
             <a:endParaRPr lang="zh-CN" altLang="en-US"/>
           </a:p>
@@ -1820,7 +1912,7 @@
           <a:p>
             <a:fld id="{EA6DD7DC-0098-4A4E-830C-B0D4E0F8B2FC}" type="datetimeFigureOut">
               <a:rPr lang="zh-CN" altLang="en-US" smtClean="0"/>
-              <a:t>2022/11/3</a:t>
+              <a:t>2022/11/30</a:t>
             </a:fld>
             <a:endParaRPr lang="zh-CN" altLang="en-US"/>
           </a:p>
@@ -1961,7 +2053,7 @@
           <a:p>
             <a:fld id="{EA6DD7DC-0098-4A4E-830C-B0D4E0F8B2FC}" type="datetimeFigureOut">
               <a:rPr lang="zh-CN" altLang="en-US" smtClean="0"/>
-              <a:t>2022/11/3</a:t>
+              <a:t>2022/11/30</a:t>
             </a:fld>
             <a:endParaRPr lang="zh-CN" altLang="en-US"/>
           </a:p>
@@ -2074,7 +2166,7 @@
           <a:p>
             <a:fld id="{EA6DD7DC-0098-4A4E-830C-B0D4E0F8B2FC}" type="datetimeFigureOut">
               <a:rPr lang="zh-CN" altLang="en-US" smtClean="0"/>
-              <a:t>2022/11/3</a:t>
+              <a:t>2022/11/30</a:t>
             </a:fld>
             <a:endParaRPr lang="zh-CN" altLang="en-US"/>
           </a:p>
@@ -2385,7 +2477,7 @@
           <a:p>
             <a:fld id="{EA6DD7DC-0098-4A4E-830C-B0D4E0F8B2FC}" type="datetimeFigureOut">
               <a:rPr lang="zh-CN" altLang="en-US" smtClean="0"/>
-              <a:t>2022/11/3</a:t>
+              <a:t>2022/11/30</a:t>
             </a:fld>
             <a:endParaRPr lang="zh-CN" altLang="en-US"/>
           </a:p>
@@ -2673,7 +2765,7 @@
           <a:p>
             <a:fld id="{EA6DD7DC-0098-4A4E-830C-B0D4E0F8B2FC}" type="datetimeFigureOut">
               <a:rPr lang="zh-CN" altLang="en-US" smtClean="0"/>
-              <a:t>2022/11/3</a:t>
+              <a:t>2022/11/30</a:t>
             </a:fld>
             <a:endParaRPr lang="zh-CN" altLang="en-US"/>
           </a:p>
@@ -2914,7 +3006,7 @@
           <a:p>
             <a:fld id="{EA6DD7DC-0098-4A4E-830C-B0D4E0F8B2FC}" type="datetimeFigureOut">
               <a:rPr lang="zh-CN" altLang="en-US" smtClean="0"/>
-              <a:t>2022/11/3</a:t>
+              <a:t>2022/11/30</a:t>
             </a:fld>
             <a:endParaRPr lang="zh-CN" altLang="en-US"/>
           </a:p>
@@ -3409,6 +3501,475 @@
 </p:sld>
 </file>
 
+<file path=ppt/slides/slide10.xml><?xml version="1.0" encoding="utf-8"?>
+<p:sld xmlns:a="http://schemas.openxmlformats.org/drawingml/2006/main" xmlns:r="http://schemas.openxmlformats.org/officeDocument/2006/relationships" xmlns:p="http://schemas.openxmlformats.org/presentationml/2006/main">
+  <p:cSld>
+    <p:spTree>
+      <p:nvGrpSpPr>
+        <p:cNvPr id="1" name=""/>
+        <p:cNvGrpSpPr/>
+        <p:nvPr/>
+      </p:nvGrpSpPr>
+      <p:grpSpPr>
+        <a:xfrm>
+          <a:off x="0" y="0"/>
+          <a:ext cx="0" cy="0"/>
+          <a:chOff x="0" y="0"/>
+          <a:chExt cx="0" cy="0"/>
+        </a:xfrm>
+      </p:grpSpPr>
+      <p:pic>
+        <p:nvPicPr>
+          <p:cNvPr id="4" name="图片 3">
+            <a:extLst>
+              <a:ext uri="{FF2B5EF4-FFF2-40B4-BE49-F238E27FC236}">
+                <a16:creationId xmlns:a16="http://schemas.microsoft.com/office/drawing/2014/main" id="{A5660003-6D17-241F-BBF4-343FDA1D950E}"/>
+              </a:ext>
+            </a:extLst>
+          </p:cNvPr>
+          <p:cNvPicPr>
+            <a:picLocks noChangeAspect="1"/>
+          </p:cNvPicPr>
+          <p:nvPr/>
+        </p:nvPicPr>
+        <p:blipFill>
+          <a:blip r:embed="rId2"/>
+          <a:stretch>
+            <a:fillRect/>
+          </a:stretch>
+        </p:blipFill>
+        <p:spPr>
+          <a:xfrm>
+            <a:off x="1824037" y="1343025"/>
+            <a:ext cx="8543925" cy="4171950"/>
+          </a:xfrm>
+          <a:prstGeom prst="rect">
+            <a:avLst/>
+          </a:prstGeom>
+        </p:spPr>
+      </p:pic>
+    </p:spTree>
+    <p:extLst>
+      <p:ext uri="{BB962C8B-B14F-4D97-AF65-F5344CB8AC3E}">
+        <p14:creationId xmlns:p14="http://schemas.microsoft.com/office/powerpoint/2010/main" val="1541105026"/>
+      </p:ext>
+    </p:extLst>
+  </p:cSld>
+  <p:clrMapOvr>
+    <a:masterClrMapping/>
+  </p:clrMapOvr>
+</p:sld>
+</file>
+
+<file path=ppt/slides/slide11.xml><?xml version="1.0" encoding="utf-8"?>
+<p:sld xmlns:a="http://schemas.openxmlformats.org/drawingml/2006/main" xmlns:r="http://schemas.openxmlformats.org/officeDocument/2006/relationships" xmlns:p="http://schemas.openxmlformats.org/presentationml/2006/main">
+  <p:cSld>
+    <p:spTree>
+      <p:nvGrpSpPr>
+        <p:cNvPr id="1" name=""/>
+        <p:cNvGrpSpPr/>
+        <p:nvPr/>
+      </p:nvGrpSpPr>
+      <p:grpSpPr>
+        <a:xfrm>
+          <a:off x="0" y="0"/>
+          <a:ext cx="0" cy="0"/>
+          <a:chOff x="0" y="0"/>
+          <a:chExt cx="0" cy="0"/>
+        </a:xfrm>
+      </p:grpSpPr>
+      <p:pic>
+        <p:nvPicPr>
+          <p:cNvPr id="4" name="图片 3">
+            <a:extLst>
+              <a:ext uri="{FF2B5EF4-FFF2-40B4-BE49-F238E27FC236}">
+                <a16:creationId xmlns:a16="http://schemas.microsoft.com/office/drawing/2014/main" id="{6D023327-A418-CD32-B045-C58DFE818C78}"/>
+              </a:ext>
+            </a:extLst>
+          </p:cNvPr>
+          <p:cNvPicPr>
+            <a:picLocks noChangeAspect="1"/>
+          </p:cNvPicPr>
+          <p:nvPr/>
+        </p:nvPicPr>
+        <p:blipFill>
+          <a:blip r:embed="rId2"/>
+          <a:stretch>
+            <a:fillRect/>
+          </a:stretch>
+        </p:blipFill>
+        <p:spPr>
+          <a:xfrm>
+            <a:off x="648930" y="3429000"/>
+            <a:ext cx="8648700" cy="1819275"/>
+          </a:xfrm>
+          <a:prstGeom prst="rect">
+            <a:avLst/>
+          </a:prstGeom>
+        </p:spPr>
+      </p:pic>
+      <p:sp>
+        <p:nvSpPr>
+          <p:cNvPr id="6" name="文本框 5">
+            <a:extLst>
+              <a:ext uri="{FF2B5EF4-FFF2-40B4-BE49-F238E27FC236}">
+                <a16:creationId xmlns:a16="http://schemas.microsoft.com/office/drawing/2014/main" id="{E214EEB2-7F73-6301-EF6F-1DDB4E3D0EDB}"/>
+              </a:ext>
+            </a:extLst>
+          </p:cNvPr>
+          <p:cNvSpPr txBox="1"/>
+          <p:nvPr/>
+        </p:nvSpPr>
+        <p:spPr>
+          <a:xfrm>
+            <a:off x="648930" y="196646"/>
+            <a:ext cx="9301316" cy="400110"/>
+          </a:xfrm>
+          <a:prstGeom prst="rect">
+            <a:avLst/>
+          </a:prstGeom>
+          <a:noFill/>
+        </p:spPr>
+        <p:txBody>
+          <a:bodyPr wrap="square" rtlCol="0">
+            <a:spAutoFit/>
+          </a:bodyPr>
+          <a:lstStyle/>
+          <a:p>
+            <a:r>
+              <a:rPr lang="en-US" altLang="zh-CN" sz="2000" dirty="0">
+                <a:latin typeface="Times New Roman" panose="02020603050405020304" pitchFamily="18" charset="0"/>
+                <a:cs typeface="Times New Roman" panose="02020603050405020304" pitchFamily="18" charset="0"/>
+              </a:rPr>
+              <a:t>Is adding Brownian process done correctly here? </a:t>
+            </a:r>
+            <a:endParaRPr lang="zh-CN" altLang="en-US" sz="2000" dirty="0">
+              <a:latin typeface="Times New Roman" panose="02020603050405020304" pitchFamily="18" charset="0"/>
+              <a:cs typeface="Times New Roman" panose="02020603050405020304" pitchFamily="18" charset="0"/>
+            </a:endParaRPr>
+          </a:p>
+        </p:txBody>
+      </p:sp>
+      <p:pic>
+        <p:nvPicPr>
+          <p:cNvPr id="9" name="图片 8">
+            <a:extLst>
+              <a:ext uri="{FF2B5EF4-FFF2-40B4-BE49-F238E27FC236}">
+                <a16:creationId xmlns:a16="http://schemas.microsoft.com/office/drawing/2014/main" id="{CBE2ACD9-DABD-DDC8-37D8-2AF5C78F00D6}"/>
+              </a:ext>
+            </a:extLst>
+          </p:cNvPr>
+          <p:cNvPicPr>
+            <a:picLocks noChangeAspect="1"/>
+          </p:cNvPicPr>
+          <p:nvPr/>
+        </p:nvPicPr>
+        <p:blipFill>
+          <a:blip r:embed="rId3"/>
+          <a:stretch>
+            <a:fillRect/>
+          </a:stretch>
+        </p:blipFill>
+        <p:spPr>
+          <a:xfrm>
+            <a:off x="648930" y="751399"/>
+            <a:ext cx="10134600" cy="2543175"/>
+          </a:xfrm>
+          <a:prstGeom prst="rect">
+            <a:avLst/>
+          </a:prstGeom>
+        </p:spPr>
+      </p:pic>
+      <p:pic>
+        <p:nvPicPr>
+          <p:cNvPr id="2" name="图片 1">
+            <a:extLst>
+              <a:ext uri="{FF2B5EF4-FFF2-40B4-BE49-F238E27FC236}">
+                <a16:creationId xmlns:a16="http://schemas.microsoft.com/office/drawing/2014/main" id="{490C37DD-36BF-5918-9C8A-5B560A3127F1}"/>
+              </a:ext>
+            </a:extLst>
+          </p:cNvPr>
+          <p:cNvPicPr>
+            <a:picLocks noChangeAspect="1"/>
+          </p:cNvPicPr>
+          <p:nvPr/>
+        </p:nvPicPr>
+        <p:blipFill>
+          <a:blip r:embed="rId4"/>
+          <a:stretch>
+            <a:fillRect/>
+          </a:stretch>
+        </p:blipFill>
+        <p:spPr>
+          <a:xfrm>
+            <a:off x="747712" y="5382701"/>
+            <a:ext cx="7038975" cy="1057275"/>
+          </a:xfrm>
+          <a:prstGeom prst="rect">
+            <a:avLst/>
+          </a:prstGeom>
+        </p:spPr>
+      </p:pic>
+    </p:spTree>
+    <p:extLst>
+      <p:ext uri="{BB962C8B-B14F-4D97-AF65-F5344CB8AC3E}">
+        <p14:creationId xmlns:p14="http://schemas.microsoft.com/office/powerpoint/2010/main" val="3747810142"/>
+      </p:ext>
+    </p:extLst>
+  </p:cSld>
+  <p:clrMapOvr>
+    <a:masterClrMapping/>
+  </p:clrMapOvr>
+</p:sld>
+</file>
+
+<file path=ppt/slides/slide12.xml><?xml version="1.0" encoding="utf-8"?>
+<p:sld xmlns:a="http://schemas.openxmlformats.org/drawingml/2006/main" xmlns:r="http://schemas.openxmlformats.org/officeDocument/2006/relationships" xmlns:p="http://schemas.openxmlformats.org/presentationml/2006/main">
+  <p:cSld>
+    <p:spTree>
+      <p:nvGrpSpPr>
+        <p:cNvPr id="1" name=""/>
+        <p:cNvGrpSpPr/>
+        <p:nvPr/>
+      </p:nvGrpSpPr>
+      <p:grpSpPr>
+        <a:xfrm>
+          <a:off x="0" y="0"/>
+          <a:ext cx="0" cy="0"/>
+          <a:chOff x="0" y="0"/>
+          <a:chExt cx="0" cy="0"/>
+        </a:xfrm>
+      </p:grpSpPr>
+      <p:sp>
+        <p:nvSpPr>
+          <p:cNvPr id="2" name="标题 1">
+            <a:extLst>
+              <a:ext uri="{FF2B5EF4-FFF2-40B4-BE49-F238E27FC236}">
+                <a16:creationId xmlns:a16="http://schemas.microsoft.com/office/drawing/2014/main" id="{BB8CBEBA-4495-D78E-EB4C-666E5A98F11C}"/>
+              </a:ext>
+            </a:extLst>
+          </p:cNvPr>
+          <p:cNvSpPr>
+            <a:spLocks noGrp="1"/>
+          </p:cNvSpPr>
+          <p:nvPr>
+            <p:ph type="title"/>
+          </p:nvPr>
+        </p:nvSpPr>
+        <p:spPr>
+          <a:xfrm>
+            <a:off x="592394" y="186813"/>
+            <a:ext cx="2671916" cy="1325563"/>
+          </a:xfrm>
+        </p:spPr>
+        <p:txBody>
+          <a:bodyPr/>
+          <a:lstStyle/>
+          <a:p>
+            <a:r>
+              <a:rPr lang="en-US" altLang="zh-CN" dirty="0"/>
+              <a:t>22.12.01</a:t>
+            </a:r>
+            <a:endParaRPr lang="zh-CN" altLang="en-US" dirty="0"/>
+          </a:p>
+        </p:txBody>
+      </p:sp>
+      <p:sp>
+        <p:nvSpPr>
+          <p:cNvPr id="4" name="文本框 3">
+            <a:extLst>
+              <a:ext uri="{FF2B5EF4-FFF2-40B4-BE49-F238E27FC236}">
+                <a16:creationId xmlns:a16="http://schemas.microsoft.com/office/drawing/2014/main" id="{8F37E2FE-DC2D-3F00-FAC1-7A9581A3B560}"/>
+              </a:ext>
+            </a:extLst>
+          </p:cNvPr>
+          <p:cNvSpPr txBox="1"/>
+          <p:nvPr/>
+        </p:nvSpPr>
+        <p:spPr>
+          <a:xfrm>
+            <a:off x="717755" y="1622323"/>
+            <a:ext cx="7718322" cy="1384995"/>
+          </a:xfrm>
+          <a:prstGeom prst="rect">
+            <a:avLst/>
+          </a:prstGeom>
+          <a:noFill/>
+        </p:spPr>
+        <p:txBody>
+          <a:bodyPr wrap="square" rtlCol="0">
+            <a:spAutoFit/>
+          </a:bodyPr>
+          <a:lstStyle/>
+          <a:p>
+            <a:pPr marL="457200" indent="-457200">
+              <a:buFont typeface="Arial" panose="020B0604020202020204" pitchFamily="34" charset="0"/>
+              <a:buChar char="•"/>
+            </a:pPr>
+            <a:r>
+              <a:rPr lang="en-US" altLang="zh-CN" sz="2800" dirty="0"/>
+              <a:t>Reproducing Nelleke’s experiment</a:t>
+            </a:r>
+          </a:p>
+          <a:p>
+            <a:pPr marL="457200" indent="-457200">
+              <a:buFont typeface="Arial" panose="020B0604020202020204" pitchFamily="34" charset="0"/>
+              <a:buChar char="•"/>
+            </a:pPr>
+            <a:endParaRPr lang="en-US" altLang="zh-CN" sz="2800" dirty="0"/>
+          </a:p>
+          <a:p>
+            <a:pPr marL="457200" indent="-457200">
+              <a:buFont typeface="Arial" panose="020B0604020202020204" pitchFamily="34" charset="0"/>
+              <a:buChar char="•"/>
+            </a:pPr>
+            <a:r>
+              <a:rPr lang="en-US" altLang="zh-CN" sz="2800" dirty="0"/>
+              <a:t>Plot the lock-exchange flow</a:t>
+            </a:r>
+            <a:endParaRPr lang="zh-CN" altLang="en-US" sz="2800" dirty="0"/>
+          </a:p>
+        </p:txBody>
+      </p:sp>
+    </p:spTree>
+    <p:extLst>
+      <p:ext uri="{BB962C8B-B14F-4D97-AF65-F5344CB8AC3E}">
+        <p14:creationId xmlns:p14="http://schemas.microsoft.com/office/powerpoint/2010/main" val="13645805"/>
+      </p:ext>
+    </p:extLst>
+  </p:cSld>
+  <p:clrMapOvr>
+    <a:masterClrMapping/>
+  </p:clrMapOvr>
+</p:sld>
+</file>
+
+<file path=ppt/slides/slide13.xml><?xml version="1.0" encoding="utf-8"?>
+<p:sld xmlns:a="http://schemas.openxmlformats.org/drawingml/2006/main" xmlns:r="http://schemas.openxmlformats.org/officeDocument/2006/relationships" xmlns:p="http://schemas.openxmlformats.org/presentationml/2006/main">
+  <p:cSld>
+    <p:spTree>
+      <p:nvGrpSpPr>
+        <p:cNvPr id="1" name=""/>
+        <p:cNvGrpSpPr/>
+        <p:nvPr/>
+      </p:nvGrpSpPr>
+      <p:grpSpPr>
+        <a:xfrm>
+          <a:off x="0" y="0"/>
+          <a:ext cx="0" cy="0"/>
+          <a:chOff x="0" y="0"/>
+          <a:chExt cx="0" cy="0"/>
+        </a:xfrm>
+      </p:grpSpPr>
+      <p:pic>
+        <p:nvPicPr>
+          <p:cNvPr id="4" name="图片 3">
+            <a:extLst>
+              <a:ext uri="{FF2B5EF4-FFF2-40B4-BE49-F238E27FC236}">
+                <a16:creationId xmlns:a16="http://schemas.microsoft.com/office/drawing/2014/main" id="{95CDC0B3-83B2-5E9B-67AB-8C1E78DDAA7F}"/>
+              </a:ext>
+            </a:extLst>
+          </p:cNvPr>
+          <p:cNvPicPr>
+            <a:picLocks noChangeAspect="1"/>
+          </p:cNvPicPr>
+          <p:nvPr/>
+        </p:nvPicPr>
+        <p:blipFill>
+          <a:blip r:embed="rId2"/>
+          <a:stretch>
+            <a:fillRect/>
+          </a:stretch>
+        </p:blipFill>
+        <p:spPr>
+          <a:xfrm>
+            <a:off x="0" y="194194"/>
+            <a:ext cx="12192000" cy="6469611"/>
+          </a:xfrm>
+          <a:prstGeom prst="rect">
+            <a:avLst/>
+          </a:prstGeom>
+        </p:spPr>
+      </p:pic>
+    </p:spTree>
+    <p:extLst>
+      <p:ext uri="{BB962C8B-B14F-4D97-AF65-F5344CB8AC3E}">
+        <p14:creationId xmlns:p14="http://schemas.microsoft.com/office/powerpoint/2010/main" val="3317092479"/>
+      </p:ext>
+    </p:extLst>
+  </p:cSld>
+  <p:clrMapOvr>
+    <a:masterClrMapping/>
+  </p:clrMapOvr>
+</p:sld>
+</file>
+
+<file path=ppt/slides/slide14.xml><?xml version="1.0" encoding="utf-8"?>
+<p:sld xmlns:a="http://schemas.openxmlformats.org/drawingml/2006/main" xmlns:r="http://schemas.openxmlformats.org/officeDocument/2006/relationships" xmlns:p="http://schemas.openxmlformats.org/presentationml/2006/main">
+  <p:cSld>
+    <p:spTree>
+      <p:nvGrpSpPr>
+        <p:cNvPr id="1" name=""/>
+        <p:cNvGrpSpPr/>
+        <p:nvPr/>
+      </p:nvGrpSpPr>
+      <p:grpSpPr>
+        <a:xfrm>
+          <a:off x="0" y="0"/>
+          <a:ext cx="0" cy="0"/>
+          <a:chOff x="0" y="0"/>
+          <a:chExt cx="0" cy="0"/>
+        </a:xfrm>
+      </p:grpSpPr>
+      <p:pic>
+        <p:nvPicPr>
+          <p:cNvPr id="5" name="图片 4" descr="图片包含 图表&#10;&#10;描述已自动生成">
+            <a:extLst>
+              <a:ext uri="{FF2B5EF4-FFF2-40B4-BE49-F238E27FC236}">
+                <a16:creationId xmlns:a16="http://schemas.microsoft.com/office/drawing/2014/main" id="{23D1E9AC-3C22-F4F0-7555-E0085F71DE65}"/>
+              </a:ext>
+            </a:extLst>
+          </p:cNvPr>
+          <p:cNvPicPr>
+            <a:picLocks noChangeAspect="1"/>
+          </p:cNvPicPr>
+          <p:nvPr/>
+        </p:nvPicPr>
+        <p:blipFill>
+          <a:blip r:embed="rId2">
+            <a:extLst>
+              <a:ext uri="{28A0092B-C50C-407E-A947-70E740481C1C}">
+                <a14:useLocalDpi xmlns:a14="http://schemas.microsoft.com/office/drawing/2010/main" val="0"/>
+              </a:ext>
+            </a:extLst>
+          </a:blip>
+          <a:stretch>
+            <a:fillRect/>
+          </a:stretch>
+        </p:blipFill>
+        <p:spPr>
+          <a:xfrm>
+            <a:off x="95250" y="0"/>
+            <a:ext cx="12001500" cy="6858000"/>
+          </a:xfrm>
+          <a:prstGeom prst="rect">
+            <a:avLst/>
+          </a:prstGeom>
+        </p:spPr>
+      </p:pic>
+    </p:spTree>
+    <p:extLst>
+      <p:ext uri="{BB962C8B-B14F-4D97-AF65-F5344CB8AC3E}">
+        <p14:creationId xmlns:p14="http://schemas.microsoft.com/office/powerpoint/2010/main" val="2509587988"/>
+      </p:ext>
+    </p:extLst>
+  </p:cSld>
+  <p:clrMapOvr>
+    <a:masterClrMapping/>
+  </p:clrMapOvr>
+</p:sld>
+</file>
+
 <file path=ppt/slides/slide2.xml><?xml version="1.0" encoding="utf-8"?>
 <p:sld xmlns:a="http://schemas.openxmlformats.org/drawingml/2006/main" xmlns:r="http://schemas.openxmlformats.org/officeDocument/2006/relationships" xmlns:p="http://schemas.openxmlformats.org/presentationml/2006/main">
   <p:cSld>
@@ -4157,10 +4718,10 @@
       </p:grpSpPr>
       <p:pic>
         <p:nvPicPr>
-          <p:cNvPr id="4" name="图片 3">
-            <a:extLst>
-              <a:ext uri="{FF2B5EF4-FFF2-40B4-BE49-F238E27FC236}">
-                <a16:creationId xmlns:a16="http://schemas.microsoft.com/office/drawing/2014/main" id="{55C65A2B-8F43-0F5B-EC3E-59C712577E2D}"/>
+          <p:cNvPr id="6" name="图片 5">
+            <a:extLst>
+              <a:ext uri="{FF2B5EF4-FFF2-40B4-BE49-F238E27FC236}">
+                <a16:creationId xmlns:a16="http://schemas.microsoft.com/office/drawing/2014/main" id="{2CF5B5D2-745D-12F8-94E8-52C66243FE96}"/>
               </a:ext>
             </a:extLst>
           </p:cNvPr>
@@ -4177,38 +4738,8 @@
         </p:blipFill>
         <p:spPr>
           <a:xfrm>
-            <a:off x="3919345" y="0"/>
-            <a:ext cx="8272655" cy="6858000"/>
-          </a:xfrm>
-          <a:prstGeom prst="rect">
-            <a:avLst/>
-          </a:prstGeom>
-        </p:spPr>
-      </p:pic>
-      <p:pic>
-        <p:nvPicPr>
-          <p:cNvPr id="6" name="图片 5">
-            <a:extLst>
-              <a:ext uri="{FF2B5EF4-FFF2-40B4-BE49-F238E27FC236}">
-                <a16:creationId xmlns:a16="http://schemas.microsoft.com/office/drawing/2014/main" id="{2CF5B5D2-745D-12F8-94E8-52C66243FE96}"/>
-              </a:ext>
-            </a:extLst>
-          </p:cNvPr>
-          <p:cNvPicPr>
-            <a:picLocks noChangeAspect="1"/>
-          </p:cNvPicPr>
-          <p:nvPr/>
-        </p:nvPicPr>
-        <p:blipFill>
-          <a:blip r:embed="rId3"/>
-          <a:stretch>
-            <a:fillRect/>
-          </a:stretch>
-        </p:blipFill>
-        <p:spPr>
-          <a:xfrm>
-            <a:off x="0" y="235753"/>
-            <a:ext cx="8855331" cy="2316486"/>
+            <a:off x="3715632" y="1376516"/>
+            <a:ext cx="8371939" cy="2190034"/>
           </a:xfrm>
           <a:prstGeom prst="rect">
             <a:avLst/>
@@ -4315,7 +4846,7 @@
           <p:cNvPr id="4" name="图片 3">
             <a:extLst>
               <a:ext uri="{FF2B5EF4-FFF2-40B4-BE49-F238E27FC236}">
-                <a16:creationId xmlns:a16="http://schemas.microsoft.com/office/drawing/2014/main" id="{6D023327-A418-CD32-B045-C58DFE818C78}"/>
+                <a16:creationId xmlns:a16="http://schemas.microsoft.com/office/drawing/2014/main" id="{D0FEEE57-B7BF-DE27-3531-AEAC3DFA3E43}"/>
               </a:ext>
             </a:extLst>
           </p:cNvPr>
@@ -4332,8 +4863,8 @@
         </p:blipFill>
         <p:spPr>
           <a:xfrm>
-            <a:off x="975238" y="4210510"/>
-            <a:ext cx="8648700" cy="1819275"/>
+            <a:off x="4080387" y="133503"/>
+            <a:ext cx="8111613" cy="6724497"/>
           </a:xfrm>
           <a:prstGeom prst="rect">
             <a:avLst/>
@@ -4342,10 +4873,10 @@
       </p:pic>
       <p:sp>
         <p:nvSpPr>
-          <p:cNvPr id="6" name="文本框 5">
-            <a:extLst>
-              <a:ext uri="{FF2B5EF4-FFF2-40B4-BE49-F238E27FC236}">
-                <a16:creationId xmlns:a16="http://schemas.microsoft.com/office/drawing/2014/main" id="{E214EEB2-7F73-6301-EF6F-1DDB4E3D0EDB}"/>
+          <p:cNvPr id="5" name="文本框 4">
+            <a:extLst>
+              <a:ext uri="{FF2B5EF4-FFF2-40B4-BE49-F238E27FC236}">
+                <a16:creationId xmlns:a16="http://schemas.microsoft.com/office/drawing/2014/main" id="{EEEDA582-69B8-38D0-D0CA-7810CA41D7B4}"/>
               </a:ext>
             </a:extLst>
           </p:cNvPr>
@@ -4354,8 +4885,8 @@
         </p:nvSpPr>
         <p:spPr>
           <a:xfrm>
-            <a:off x="1132861" y="943897"/>
-            <a:ext cx="9301316" cy="400110"/>
+            <a:off x="104429" y="2787992"/>
+            <a:ext cx="3814916" cy="3970318"/>
           </a:xfrm>
           <a:prstGeom prst="rect">
             <a:avLst/>
@@ -4363,31 +4894,114 @@
           <a:noFill/>
         </p:spPr>
         <p:txBody>
-          <a:bodyPr wrap="square" rtlCol="0">
+          <a:bodyPr wrap="square">
             <a:spAutoFit/>
           </a:bodyPr>
           <a:lstStyle/>
           <a:p>
             <a:r>
-              <a:rPr lang="en-US" altLang="zh-CN" sz="2000" dirty="0">
-                <a:latin typeface="Times New Roman" panose="02020603050405020304" pitchFamily="18" charset="0"/>
-                <a:cs typeface="Times New Roman" panose="02020603050405020304" pitchFamily="18" charset="0"/>
-              </a:rPr>
-              <a:t>Is adding Brownian process correctly here? </a:t>
-            </a:r>
-            <a:endParaRPr lang="zh-CN" altLang="en-US" sz="2000" dirty="0">
-              <a:latin typeface="Times New Roman" panose="02020603050405020304" pitchFamily="18" charset="0"/>
-              <a:cs typeface="Times New Roman" panose="02020603050405020304" pitchFamily="18" charset="0"/>
-            </a:endParaRPr>
-          </a:p>
-        </p:txBody>
-      </p:sp>
+              <a:rPr lang="zh-CN" altLang="en-US" dirty="0"/>
+              <a:t>julia&gt; filename = "data\\dcsm-fm_201703\\DCSM-FM_05nm_0001_map.nc"</a:t>
+            </a:r>
+          </a:p>
+          <a:p>
+            <a:r>
+              <a:rPr lang="zh-CN" altLang="en-US" dirty="0"/>
+              <a:t>"data\\dcsm-fm_201703\\DCSM-FM_05nm_0001_map.nc"</a:t>
+            </a:r>
+          </a:p>
+          <a:p>
+            <a:endParaRPr lang="zh-CN" altLang="en-US" dirty="0"/>
+          </a:p>
+          <a:p>
+            <a:r>
+              <a:rPr lang="zh-CN" altLang="en-US" dirty="0"/>
+              <a:t>julia&gt; filepath = joinpath(@__DIR__, filename)</a:t>
+            </a:r>
+          </a:p>
+          <a:p>
+            <a:r>
+              <a:rPr lang="zh-CN" altLang="en-US" dirty="0"/>
+              <a:t>"I:\\Master_Thesis\\particles.jl\\case_drifters_german_bight\\data\\dcsm-fm_201703\\DCSM-FM_05nm_0001_map.nc"</a:t>
+            </a:r>
+          </a:p>
+          <a:p>
+            <a:endParaRPr lang="zh-CN" altLang="en-US" dirty="0"/>
+          </a:p>
+          <a:p>
+            <a:r>
+              <a:rPr lang="zh-CN" altLang="en-US" dirty="0"/>
+              <a:t>julia&gt; ncinfo(filename)</a:t>
+            </a:r>
+          </a:p>
+        </p:txBody>
+      </p:sp>
+    </p:spTree>
+    <p:extLst>
+      <p:ext uri="{BB962C8B-B14F-4D97-AF65-F5344CB8AC3E}">
+        <p14:creationId xmlns:p14="http://schemas.microsoft.com/office/powerpoint/2010/main" val="2692592295"/>
+      </p:ext>
+    </p:extLst>
+  </p:cSld>
+  <p:clrMapOvr>
+    <a:masterClrMapping/>
+  </p:clrMapOvr>
+</p:sld>
+</file>
+
+<file path=ppt/slides/slide7.xml><?xml version="1.0" encoding="utf-8"?>
+<p:sld xmlns:a="http://schemas.openxmlformats.org/drawingml/2006/main" xmlns:r="http://schemas.openxmlformats.org/officeDocument/2006/relationships" xmlns:p="http://schemas.openxmlformats.org/presentationml/2006/main">
+  <p:cSld>
+    <p:spTree>
+      <p:nvGrpSpPr>
+        <p:cNvPr id="1" name=""/>
+        <p:cNvGrpSpPr/>
+        <p:nvPr/>
+      </p:nvGrpSpPr>
+      <p:grpSpPr>
+        <a:xfrm>
+          <a:off x="0" y="0"/>
+          <a:ext cx="0" cy="0"/>
+          <a:chOff x="0" y="0"/>
+          <a:chExt cx="0" cy="0"/>
+        </a:xfrm>
+      </p:grpSpPr>
       <p:pic>
         <p:nvPicPr>
-          <p:cNvPr id="9" name="图片 8">
-            <a:extLst>
-              <a:ext uri="{FF2B5EF4-FFF2-40B4-BE49-F238E27FC236}">
-                <a16:creationId xmlns:a16="http://schemas.microsoft.com/office/drawing/2014/main" id="{CBE2ACD9-DABD-DDC8-37D8-2AF5C78F00D6}"/>
+          <p:cNvPr id="4" name="图片 3">
+            <a:extLst>
+              <a:ext uri="{FF2B5EF4-FFF2-40B4-BE49-F238E27FC236}">
+                <a16:creationId xmlns:a16="http://schemas.microsoft.com/office/drawing/2014/main" id="{9D1C46E9-2CE0-9748-21CD-85349EBB306E}"/>
+              </a:ext>
+            </a:extLst>
+          </p:cNvPr>
+          <p:cNvPicPr>
+            <a:picLocks noChangeAspect="1"/>
+          </p:cNvPicPr>
+          <p:nvPr/>
+        </p:nvPicPr>
+        <p:blipFill>
+          <a:blip r:embed="rId2"/>
+          <a:stretch>
+            <a:fillRect/>
+          </a:stretch>
+        </p:blipFill>
+        <p:spPr>
+          <a:xfrm>
+            <a:off x="844498" y="225528"/>
+            <a:ext cx="9382125" cy="4381500"/>
+          </a:xfrm>
+          <a:prstGeom prst="rect">
+            <a:avLst/>
+          </a:prstGeom>
+        </p:spPr>
+      </p:pic>
+      <p:pic>
+        <p:nvPicPr>
+          <p:cNvPr id="5" name="图片 4">
+            <a:extLst>
+              <a:ext uri="{FF2B5EF4-FFF2-40B4-BE49-F238E27FC236}">
+                <a16:creationId xmlns:a16="http://schemas.microsoft.com/office/drawing/2014/main" id="{205FB522-C649-A842-E30A-62632080A1AB}"/>
               </a:ext>
             </a:extLst>
           </p:cNvPr>
@@ -4404,8 +5018,272 @@
         </p:blipFill>
         <p:spPr>
           <a:xfrm>
-            <a:off x="1132861" y="1449489"/>
-            <a:ext cx="10134600" cy="2543175"/>
+            <a:off x="913324" y="5752178"/>
+            <a:ext cx="8191500" cy="752475"/>
+          </a:xfrm>
+          <a:prstGeom prst="rect">
+            <a:avLst/>
+          </a:prstGeom>
+        </p:spPr>
+      </p:pic>
+      <p:pic>
+        <p:nvPicPr>
+          <p:cNvPr id="6" name="图片 5">
+            <a:extLst>
+              <a:ext uri="{FF2B5EF4-FFF2-40B4-BE49-F238E27FC236}">
+                <a16:creationId xmlns:a16="http://schemas.microsoft.com/office/drawing/2014/main" id="{677585BF-A0C7-8E15-EEC8-0B7D6C42BD26}"/>
+              </a:ext>
+            </a:extLst>
+          </p:cNvPr>
+          <p:cNvPicPr>
+            <a:picLocks noChangeAspect="1"/>
+          </p:cNvPicPr>
+          <p:nvPr/>
+        </p:nvPicPr>
+        <p:blipFill>
+          <a:blip r:embed="rId4"/>
+          <a:stretch>
+            <a:fillRect/>
+          </a:stretch>
+        </p:blipFill>
+        <p:spPr>
+          <a:xfrm>
+            <a:off x="844498" y="4184547"/>
+            <a:ext cx="9753600" cy="1695450"/>
+          </a:xfrm>
+          <a:prstGeom prst="rect">
+            <a:avLst/>
+          </a:prstGeom>
+        </p:spPr>
+      </p:pic>
+      <p:grpSp>
+        <p:nvGrpSpPr>
+          <p:cNvPr id="10" name="组合 9">
+            <a:extLst>
+              <a:ext uri="{FF2B5EF4-FFF2-40B4-BE49-F238E27FC236}">
+                <a16:creationId xmlns:a16="http://schemas.microsoft.com/office/drawing/2014/main" id="{0CFF2B6B-2847-B88C-6086-0FC4A3E41B58}"/>
+              </a:ext>
+            </a:extLst>
+          </p:cNvPr>
+          <p:cNvGrpSpPr/>
+          <p:nvPr/>
+        </p:nvGrpSpPr>
+        <p:grpSpPr>
+          <a:xfrm>
+            <a:off x="5692610" y="3234581"/>
+            <a:ext cx="265680" cy="20160"/>
+            <a:chOff x="5692610" y="3234581"/>
+            <a:chExt cx="265680" cy="20160"/>
+          </a:xfrm>
+        </p:grpSpPr>
+        <mc:AlternateContent xmlns:mc="http://schemas.openxmlformats.org/markup-compatibility/2006" xmlns:p14="http://schemas.microsoft.com/office/powerpoint/2010/main">
+          <mc:Choice Requires="p14">
+            <p:contentPart p14:bwMode="auto" r:id="rId5">
+              <p14:nvContentPartPr>
+                <p14:cNvPr id="8" name="墨迹 7">
+                  <a:extLst>
+                    <a:ext uri="{FF2B5EF4-FFF2-40B4-BE49-F238E27FC236}">
+                      <a16:creationId xmlns:a16="http://schemas.microsoft.com/office/drawing/2014/main" id="{2D136197-D80C-59AC-F491-061A93C9C623}"/>
+                    </a:ext>
+                  </a:extLst>
+                </p14:cNvPr>
+                <p14:cNvContentPartPr/>
+                <p14:nvPr/>
+              </p14:nvContentPartPr>
+              <p14:xfrm>
+                <a:off x="5692610" y="3234581"/>
+                <a:ext cx="255240" cy="19800"/>
+              </p14:xfrm>
+            </p:contentPart>
+          </mc:Choice>
+          <mc:Fallback xmlns="">
+            <p:pic>
+              <p:nvPicPr>
+                <p:cNvPr id="8" name="墨迹 7">
+                  <a:extLst>
+                    <a:ext uri="{FF2B5EF4-FFF2-40B4-BE49-F238E27FC236}">
+                      <a16:creationId xmlns:a16="http://schemas.microsoft.com/office/drawing/2014/main" id="{2D136197-D80C-59AC-F491-061A93C9C623}"/>
+                    </a:ext>
+                  </a:extLst>
+                </p:cNvPr>
+                <p:cNvPicPr/>
+                <p:nvPr/>
+              </p:nvPicPr>
+              <p:blipFill>
+                <a:blip r:embed="rId6"/>
+                <a:stretch>
+                  <a:fillRect/>
+                </a:stretch>
+              </p:blipFill>
+              <p:spPr>
+                <a:xfrm>
+                  <a:off x="5683970" y="3225581"/>
+                  <a:ext cx="272880" cy="37440"/>
+                </a:xfrm>
+                <a:prstGeom prst="rect">
+                  <a:avLst/>
+                </a:prstGeom>
+              </p:spPr>
+            </p:pic>
+          </mc:Fallback>
+        </mc:AlternateContent>
+        <mc:AlternateContent xmlns:mc="http://schemas.openxmlformats.org/markup-compatibility/2006" xmlns:p14="http://schemas.microsoft.com/office/powerpoint/2010/main">
+          <mc:Choice Requires="p14">
+            <p:contentPart p14:bwMode="auto" r:id="rId7">
+              <p14:nvContentPartPr>
+                <p14:cNvPr id="9" name="墨迹 8">
+                  <a:extLst>
+                    <a:ext uri="{FF2B5EF4-FFF2-40B4-BE49-F238E27FC236}">
+                      <a16:creationId xmlns:a16="http://schemas.microsoft.com/office/drawing/2014/main" id="{F6483986-550F-9749-E324-1B0C89B9ECC6}"/>
+                    </a:ext>
+                  </a:extLst>
+                </p14:cNvPr>
+                <p14:cNvContentPartPr/>
+                <p14:nvPr/>
+              </p14:nvContentPartPr>
+              <p14:xfrm>
+                <a:off x="5957930" y="3254381"/>
+                <a:ext cx="360" cy="360"/>
+              </p14:xfrm>
+            </p:contentPart>
+          </mc:Choice>
+          <mc:Fallback xmlns="">
+            <p:pic>
+              <p:nvPicPr>
+                <p:cNvPr id="9" name="墨迹 8">
+                  <a:extLst>
+                    <a:ext uri="{FF2B5EF4-FFF2-40B4-BE49-F238E27FC236}">
+                      <a16:creationId xmlns:a16="http://schemas.microsoft.com/office/drawing/2014/main" id="{F6483986-550F-9749-E324-1B0C89B9ECC6}"/>
+                    </a:ext>
+                  </a:extLst>
+                </p:cNvPr>
+                <p:cNvPicPr/>
+                <p:nvPr/>
+              </p:nvPicPr>
+              <p:blipFill>
+                <a:blip r:embed="rId8"/>
+                <a:stretch>
+                  <a:fillRect/>
+                </a:stretch>
+              </p:blipFill>
+              <p:spPr>
+                <a:xfrm>
+                  <a:off x="5949290" y="3245741"/>
+                  <a:ext cx="18000" cy="18000"/>
+                </a:xfrm>
+                <a:prstGeom prst="rect">
+                  <a:avLst/>
+                </a:prstGeom>
+              </p:spPr>
+            </p:pic>
+          </mc:Fallback>
+        </mc:AlternateContent>
+      </p:grpSp>
+      <mc:AlternateContent xmlns:mc="http://schemas.openxmlformats.org/markup-compatibility/2006" xmlns:p14="http://schemas.microsoft.com/office/powerpoint/2010/main">
+        <mc:Choice Requires="p14">
+          <p:contentPart p14:bwMode="auto" r:id="rId9">
+            <p14:nvContentPartPr>
+              <p14:cNvPr id="11" name="墨迹 10">
+                <a:extLst>
+                  <a:ext uri="{FF2B5EF4-FFF2-40B4-BE49-F238E27FC236}">
+                    <a16:creationId xmlns:a16="http://schemas.microsoft.com/office/drawing/2014/main" id="{A99695C1-A545-78CD-53F5-69DBC3093D5A}"/>
+                  </a:ext>
+                </a:extLst>
+              </p14:cNvPr>
+              <p14:cNvContentPartPr/>
+              <p14:nvPr/>
+            </p14:nvContentPartPr>
+            <p14:xfrm>
+              <a:off x="8160770" y="6203501"/>
+              <a:ext cx="500400" cy="49680"/>
+            </p14:xfrm>
+          </p:contentPart>
+        </mc:Choice>
+        <mc:Fallback xmlns="">
+          <p:pic>
+            <p:nvPicPr>
+              <p:cNvPr id="11" name="墨迹 10">
+                <a:extLst>
+                  <a:ext uri="{FF2B5EF4-FFF2-40B4-BE49-F238E27FC236}">
+                    <a16:creationId xmlns:a16="http://schemas.microsoft.com/office/drawing/2014/main" id="{A99695C1-A545-78CD-53F5-69DBC3093D5A}"/>
+                  </a:ext>
+                </a:extLst>
+              </p:cNvPr>
+              <p:cNvPicPr/>
+              <p:nvPr/>
+            </p:nvPicPr>
+            <p:blipFill>
+              <a:blip r:embed="rId10"/>
+              <a:stretch>
+                <a:fillRect/>
+              </a:stretch>
+            </p:blipFill>
+            <p:spPr>
+              <a:xfrm>
+                <a:off x="8151770" y="6194861"/>
+                <a:ext cx="518040" cy="67320"/>
+              </a:xfrm>
+              <a:prstGeom prst="rect">
+                <a:avLst/>
+              </a:prstGeom>
+            </p:spPr>
+          </p:pic>
+        </mc:Fallback>
+      </mc:AlternateContent>
+    </p:spTree>
+    <p:extLst>
+      <p:ext uri="{BB962C8B-B14F-4D97-AF65-F5344CB8AC3E}">
+        <p14:creationId xmlns:p14="http://schemas.microsoft.com/office/powerpoint/2010/main" val="3394543559"/>
+      </p:ext>
+    </p:extLst>
+  </p:cSld>
+  <p:clrMapOvr>
+    <a:masterClrMapping/>
+  </p:clrMapOvr>
+</p:sld>
+</file>
+
+<file path=ppt/slides/slide8.xml><?xml version="1.0" encoding="utf-8"?>
+<p:sld xmlns:a="http://schemas.openxmlformats.org/drawingml/2006/main" xmlns:r="http://schemas.openxmlformats.org/officeDocument/2006/relationships" xmlns:p="http://schemas.openxmlformats.org/presentationml/2006/main">
+  <p:cSld>
+    <p:spTree>
+      <p:nvGrpSpPr>
+        <p:cNvPr id="1" name=""/>
+        <p:cNvGrpSpPr/>
+        <p:nvPr/>
+      </p:nvGrpSpPr>
+      <p:grpSpPr>
+        <a:xfrm>
+          <a:off x="0" y="0"/>
+          <a:ext cx="0" cy="0"/>
+          <a:chOff x="0" y="0"/>
+          <a:chExt cx="0" cy="0"/>
+        </a:xfrm>
+      </p:grpSpPr>
+      <p:pic>
+        <p:nvPicPr>
+          <p:cNvPr id="4" name="图片 3">
+            <a:extLst>
+              <a:ext uri="{FF2B5EF4-FFF2-40B4-BE49-F238E27FC236}">
+                <a16:creationId xmlns:a16="http://schemas.microsoft.com/office/drawing/2014/main" id="{A1AF40C7-CA25-3604-57AE-6274C2E40838}"/>
+              </a:ext>
+            </a:extLst>
+          </p:cNvPr>
+          <p:cNvPicPr>
+            <a:picLocks noChangeAspect="1"/>
+          </p:cNvPicPr>
+          <p:nvPr/>
+        </p:nvPicPr>
+        <p:blipFill>
+          <a:blip r:embed="rId2"/>
+          <a:stretch>
+            <a:fillRect/>
+          </a:stretch>
+        </p:blipFill>
+        <p:spPr>
+          <a:xfrm>
+            <a:off x="0" y="194194"/>
+            <a:ext cx="12192000" cy="6469611"/>
           </a:xfrm>
           <a:prstGeom prst="rect">
             <a:avLst/>
@@ -4415,7 +5293,67 @@
     </p:spTree>
     <p:extLst>
       <p:ext uri="{BB962C8B-B14F-4D97-AF65-F5344CB8AC3E}">
-        <p14:creationId xmlns:p14="http://schemas.microsoft.com/office/powerpoint/2010/main" val="3747810142"/>
+        <p14:creationId xmlns:p14="http://schemas.microsoft.com/office/powerpoint/2010/main" val="1722995336"/>
+      </p:ext>
+    </p:extLst>
+  </p:cSld>
+  <p:clrMapOvr>
+    <a:masterClrMapping/>
+  </p:clrMapOvr>
+</p:sld>
+</file>
+
+<file path=ppt/slides/slide9.xml><?xml version="1.0" encoding="utf-8"?>
+<p:sld xmlns:a="http://schemas.openxmlformats.org/drawingml/2006/main" xmlns:r="http://schemas.openxmlformats.org/officeDocument/2006/relationships" xmlns:p="http://schemas.openxmlformats.org/presentationml/2006/main">
+  <p:cSld>
+    <p:spTree>
+      <p:nvGrpSpPr>
+        <p:cNvPr id="1" name=""/>
+        <p:cNvGrpSpPr/>
+        <p:nvPr/>
+      </p:nvGrpSpPr>
+      <p:grpSpPr>
+        <a:xfrm>
+          <a:off x="0" y="0"/>
+          <a:ext cx="0" cy="0"/>
+          <a:chOff x="0" y="0"/>
+          <a:chExt cx="0" cy="0"/>
+        </a:xfrm>
+      </p:grpSpPr>
+      <p:pic>
+        <p:nvPicPr>
+          <p:cNvPr id="4" name="图片 3">
+            <a:extLst>
+              <a:ext uri="{FF2B5EF4-FFF2-40B4-BE49-F238E27FC236}">
+                <a16:creationId xmlns:a16="http://schemas.microsoft.com/office/drawing/2014/main" id="{E3B0115A-F827-E3A8-B924-FDE52E392307}"/>
+              </a:ext>
+            </a:extLst>
+          </p:cNvPr>
+          <p:cNvPicPr>
+            <a:picLocks noChangeAspect="1"/>
+          </p:cNvPicPr>
+          <p:nvPr/>
+        </p:nvPicPr>
+        <p:blipFill>
+          <a:blip r:embed="rId2"/>
+          <a:stretch>
+            <a:fillRect/>
+          </a:stretch>
+        </p:blipFill>
+        <p:spPr>
+          <a:xfrm>
+            <a:off x="1325357" y="2029439"/>
+            <a:ext cx="8715375" cy="4362450"/>
+          </a:xfrm>
+          <a:prstGeom prst="rect">
+            <a:avLst/>
+          </a:prstGeom>
+        </p:spPr>
+      </p:pic>
+    </p:spTree>
+    <p:extLst>
+      <p:ext uri="{BB962C8B-B14F-4D97-AF65-F5344CB8AC3E}">
+        <p14:creationId xmlns:p14="http://schemas.microsoft.com/office/powerpoint/2010/main" val="1281872385"/>
       </p:ext>
     </p:extLst>
   </p:cSld>

</xml_diff>